<commit_message>
fixed self-referential url for presentation
</commit_message>
<xml_diff>
--- a/2020-02-18/credentials_and_capabilities.pptx
+++ b/2020-02-18/credentials_and_capabilities.pptx
@@ -13329,20 +13329,20 @@
             <a:pPr algn="ctr"/>
             <a:r>
               <a:rPr lang="en-US" dirty="0" smtClean="0"/>
-              <a:t>Credentials &amp; </a:t>
-            </a:r>
-            <a:r>
-              <a:rPr lang="en-US" dirty="0" smtClean="0"/>
-              <a:t>Capabilities</a:t>
+              <a:t>Credentials &amp; Capabilities</a:t>
+            </a:r>
+            <a:r>
+              <a:rPr lang="en-US" smtClean="0"/>
+              <a:t/>
             </a:r>
             <a:br>
-              <a:rPr lang="en-US" dirty="0" smtClean="0"/>
+              <a:rPr lang="en-US" smtClean="0"/>
             </a:br>
             <a:r>
-              <a:rPr lang="en-US" sz="1200" dirty="0">
+              <a:rPr lang="en-US" sz="1200" smtClean="0">
                 <a:hlinkClick r:id="rId3"/>
               </a:rPr>
-              <a:t>https://github.com/w3c-ccg/meetings/blob/gh-pages/2020-02-20/credentials_and_capabilities.pptx</a:t>
+              <a:t>https://github.com/w3c-ccg/meetings/blob/gh-pages/2020-02-18/credentials_and_capabilities.pptx?raw=true</a:t>
             </a:r>
             <a:r>
               <a:rPr lang="en-US" sz="1200" dirty="0"/>
@@ -13431,15 +13431,7 @@
                   <a:schemeClr val="bg1"/>
                 </a:solidFill>
               </a:rPr>
-              <a:t>dual l</a:t>
-            </a:r>
-            <a:r>
-              <a:rPr lang="en-US" sz="1200" dirty="0" smtClean="0">
-                <a:solidFill>
-                  <a:schemeClr val="bg1"/>
-                </a:solidFill>
-              </a:rPr>
-              <a:t>icensed </a:t>
+              <a:t>dual licensed </a:t>
             </a:r>
             <a:r>
               <a:rPr lang="en-US" sz="1200" dirty="0">
@@ -13640,11 +13632,7 @@
           <a:p>
             <a:r>
               <a:rPr lang="en-US" dirty="0" smtClean="0"/>
-              <a:t>“Directed Capabilities</a:t>
-            </a:r>
-            <a:r>
-              <a:rPr lang="en-US" dirty="0" smtClean="0"/>
-              <a:t>” is a generic term</a:t>
+              <a:t>“Directed Capabilities” is a generic term</a:t>
             </a:r>
           </a:p>
         </p:txBody>
@@ -13956,13 +13944,8 @@
           <a:p>
             <a:r>
               <a:rPr lang="en-US" dirty="0" smtClean="0"/>
-              <a:t>May be created </a:t>
-            </a:r>
-            <a:r>
-              <a:rPr lang="en-US" dirty="0" smtClean="0"/>
-              <a:t>with ability for</a:t>
-            </a:r>
-            <a:endParaRPr lang="en-US" dirty="0" smtClean="0"/>
+              <a:t>May be created with ability for</a:t>
+            </a:r>
           </a:p>
           <a:p>
             <a:pPr lvl="1"/>
@@ -14103,15 +14086,7 @@
           <a:p>
             <a:r>
               <a:rPr lang="en-US" dirty="0" smtClean="0"/>
-              <a:t>If a non-revoked </a:t>
-            </a:r>
-            <a:r>
-              <a:rPr lang="en-US" dirty="0" smtClean="0"/>
-              <a:t>Directed Capability </a:t>
-            </a:r>
-            <a:r>
-              <a:rPr lang="en-US" dirty="0" smtClean="0"/>
-              <a:t>is invoked for a valid action, the action is performed.</a:t>
+              <a:t>If a non-revoked Directed Capability is invoked for a valid action, the action is performed.</a:t>
             </a:r>
           </a:p>
           <a:p>
@@ -14123,11 +14098,7 @@
           <a:p>
             <a:r>
               <a:rPr lang="en-US" dirty="0" smtClean="0"/>
-              <a:t>Authorization decisions are based on the </a:t>
-            </a:r>
-            <a:r>
-              <a:rPr lang="en-US" dirty="0" smtClean="0"/>
-              <a:t>Directed </a:t>
+              <a:t>Authorization decisions are based on the Directed </a:t>
             </a:r>
             <a:r>
               <a:rPr lang="en-US" dirty="0" err="1" smtClean="0"/>
@@ -14135,11 +14106,7 @@
             </a:r>
             <a:r>
               <a:rPr lang="en-US" dirty="0" smtClean="0"/>
-              <a:t> </a:t>
-            </a:r>
-            <a:r>
-              <a:rPr lang="en-US" dirty="0" smtClean="0"/>
-              <a:t>integrity, NOT contextual rules, ambient authority, or ACLs</a:t>
+              <a:t> integrity, NOT contextual rules, ambient authority, or ACLs</a:t>
             </a:r>
             <a:endParaRPr lang="en-US" dirty="0"/>
           </a:p>
@@ -14255,15 +14222,7 @@
             <a:pPr lvl="1"/>
             <a:r>
               <a:rPr lang="en-US" dirty="0" smtClean="0"/>
-              <a:t>Doesn’t depend on the </a:t>
-            </a:r>
-            <a:r>
-              <a:rPr lang="en-US" dirty="0" smtClean="0"/>
-              <a:t>“identity” </a:t>
-            </a:r>
-            <a:r>
-              <a:rPr lang="en-US" dirty="0" smtClean="0"/>
-              <a:t>of the user</a:t>
+              <a:t>Doesn’t depend on the “identity” of the user</a:t>
             </a:r>
           </a:p>
           <a:p>
@@ -14556,15 +14515,7 @@
             <a:pPr lvl="1"/>
             <a:r>
               <a:rPr lang="en-US" dirty="0" smtClean="0"/>
-              <a:t>You can limit which actions a delegated capability can do, and potentially when </a:t>
-            </a:r>
-            <a:r>
-              <a:rPr lang="en-US" dirty="0" smtClean="0"/>
-              <a:t>it </a:t>
-            </a:r>
-            <a:r>
-              <a:rPr lang="en-US" dirty="0" smtClean="0"/>
-              <a:t>can be used.</a:t>
+              <a:t>You can limit which actions a delegated capability can do, and potentially when it can be used.</a:t>
             </a:r>
           </a:p>
         </p:txBody>
@@ -14926,19 +14877,11 @@
           <a:p>
             <a:r>
               <a:rPr lang="en-US" dirty="0" smtClean="0"/>
-              <a:t>A </a:t>
-            </a:r>
-            <a:r>
-              <a:rPr lang="en-US" dirty="0" smtClean="0"/>
-              <a:t>Directed Capability</a:t>
+              <a:t>A Directed Capability</a:t>
             </a:r>
             <a:r>
               <a:rPr lang="en-US" baseline="0" dirty="0" smtClean="0"/>
-              <a:t> </a:t>
-            </a:r>
-            <a:r>
-              <a:rPr lang="en-US" baseline="0" dirty="0" smtClean="0"/>
-              <a:t>Car Key</a:t>
+              <a:t> Car Key</a:t>
             </a:r>
             <a:endParaRPr lang="en-US" dirty="0"/>
           </a:p>
@@ -15258,15 +15201,7 @@
           <a:p>
             <a:r>
               <a:rPr lang="en-US" dirty="0" smtClean="0"/>
-              <a:t>A </a:t>
-            </a:r>
-            <a:r>
-              <a:rPr lang="en-US" dirty="0" smtClean="0"/>
-              <a:t>Directed Banking </a:t>
-            </a:r>
-            <a:r>
-              <a:rPr lang="en-US" dirty="0" smtClean="0"/>
-              <a:t>Capability</a:t>
+              <a:t>A Directed Banking Capability</a:t>
             </a:r>
             <a:endParaRPr lang="en-US" dirty="0"/>
           </a:p>

</xml_diff>